<commit_message>
added an ex customizable card
</commit_message>
<xml_diff>
--- a/data/mockups.pptx
+++ b/data/mockups.pptx
@@ -254,7 +254,7 @@
           <a:p>
             <a:fld id="{60287405-953B-4349-A719-48CAA62A9407}" type="datetimeFigureOut">
               <a:rPr lang="en-US" smtClean="0"/>
-              <a:t>8/16/2014</a:t>
+              <a:t>8/19/2014</a:t>
             </a:fld>
             <a:endParaRPr lang="en-US"/>
           </a:p>
@@ -424,7 +424,7 @@
           <a:p>
             <a:fld id="{60287405-953B-4349-A719-48CAA62A9407}" type="datetimeFigureOut">
               <a:rPr lang="en-US" smtClean="0"/>
-              <a:t>8/16/2014</a:t>
+              <a:t>8/19/2014</a:t>
             </a:fld>
             <a:endParaRPr lang="en-US"/>
           </a:p>
@@ -604,7 +604,7 @@
           <a:p>
             <a:fld id="{60287405-953B-4349-A719-48CAA62A9407}" type="datetimeFigureOut">
               <a:rPr lang="en-US" smtClean="0"/>
-              <a:t>8/16/2014</a:t>
+              <a:t>8/19/2014</a:t>
             </a:fld>
             <a:endParaRPr lang="en-US"/>
           </a:p>
@@ -774,7 +774,7 @@
           <a:p>
             <a:fld id="{60287405-953B-4349-A719-48CAA62A9407}" type="datetimeFigureOut">
               <a:rPr lang="en-US" smtClean="0"/>
-              <a:t>8/16/2014</a:t>
+              <a:t>8/19/2014</a:t>
             </a:fld>
             <a:endParaRPr lang="en-US"/>
           </a:p>
@@ -1020,7 +1020,7 @@
           <a:p>
             <a:fld id="{60287405-953B-4349-A719-48CAA62A9407}" type="datetimeFigureOut">
               <a:rPr lang="en-US" smtClean="0"/>
-              <a:t>8/16/2014</a:t>
+              <a:t>8/19/2014</a:t>
             </a:fld>
             <a:endParaRPr lang="en-US"/>
           </a:p>
@@ -1252,7 +1252,7 @@
           <a:p>
             <a:fld id="{60287405-953B-4349-A719-48CAA62A9407}" type="datetimeFigureOut">
               <a:rPr lang="en-US" smtClean="0"/>
-              <a:t>8/16/2014</a:t>
+              <a:t>8/19/2014</a:t>
             </a:fld>
             <a:endParaRPr lang="en-US"/>
           </a:p>
@@ -1619,7 +1619,7 @@
           <a:p>
             <a:fld id="{60287405-953B-4349-A719-48CAA62A9407}" type="datetimeFigureOut">
               <a:rPr lang="en-US" smtClean="0"/>
-              <a:t>8/16/2014</a:t>
+              <a:t>8/19/2014</a:t>
             </a:fld>
             <a:endParaRPr lang="en-US"/>
           </a:p>
@@ -1737,7 +1737,7 @@
           <a:p>
             <a:fld id="{60287405-953B-4349-A719-48CAA62A9407}" type="datetimeFigureOut">
               <a:rPr lang="en-US" smtClean="0"/>
-              <a:t>8/16/2014</a:t>
+              <a:t>8/19/2014</a:t>
             </a:fld>
             <a:endParaRPr lang="en-US"/>
           </a:p>
@@ -1832,7 +1832,7 @@
           <a:p>
             <a:fld id="{60287405-953B-4349-A719-48CAA62A9407}" type="datetimeFigureOut">
               <a:rPr lang="en-US" smtClean="0"/>
-              <a:t>8/16/2014</a:t>
+              <a:t>8/19/2014</a:t>
             </a:fld>
             <a:endParaRPr lang="en-US"/>
           </a:p>
@@ -2109,7 +2109,7 @@
           <a:p>
             <a:fld id="{60287405-953B-4349-A719-48CAA62A9407}" type="datetimeFigureOut">
               <a:rPr lang="en-US" smtClean="0"/>
-              <a:t>8/16/2014</a:t>
+              <a:t>8/19/2014</a:t>
             </a:fld>
             <a:endParaRPr lang="en-US"/>
           </a:p>
@@ -2362,7 +2362,7 @@
           <a:p>
             <a:fld id="{60287405-953B-4349-A719-48CAA62A9407}" type="datetimeFigureOut">
               <a:rPr lang="en-US" smtClean="0"/>
-              <a:t>8/16/2014</a:t>
+              <a:t>8/19/2014</a:t>
             </a:fld>
             <a:endParaRPr lang="en-US"/>
           </a:p>
@@ -2575,7 +2575,7 @@
           <a:p>
             <a:fld id="{60287405-953B-4349-A719-48CAA62A9407}" type="datetimeFigureOut">
               <a:rPr lang="en-US" smtClean="0"/>
-              <a:t>8/16/2014</a:t>
+              <a:t>8/19/2014</a:t>
             </a:fld>
             <a:endParaRPr lang="en-US"/>
           </a:p>
@@ -4418,6 +4418,116 @@
           </p:txBody>
         </p:sp>
       </p:grpSp>
+      <p:sp>
+        <p:nvSpPr>
+          <p:cNvPr id="43" name="Rectangle 42"/>
+          <p:cNvSpPr/>
+          <p:nvPr/>
+        </p:nvSpPr>
+        <p:spPr>
+          <a:xfrm>
+            <a:off x="4434114" y="4898562"/>
+            <a:ext cx="3323772" cy="1814286"/>
+          </a:xfrm>
+          <a:prstGeom prst="rect">
+            <a:avLst/>
+          </a:prstGeom>
+          <a:solidFill>
+            <a:schemeClr val="bg1"/>
+          </a:solidFill>
+          <a:ln>
+            <a:solidFill>
+              <a:schemeClr val="bg1">
+                <a:lumMod val="65000"/>
+              </a:schemeClr>
+            </a:solidFill>
+          </a:ln>
+        </p:spPr>
+        <p:style>
+          <a:lnRef idx="2">
+            <a:schemeClr val="accent1">
+              <a:shade val="50000"/>
+            </a:schemeClr>
+          </a:lnRef>
+          <a:fillRef idx="1">
+            <a:schemeClr val="accent1"/>
+          </a:fillRef>
+          <a:effectRef idx="0">
+            <a:schemeClr val="accent1"/>
+          </a:effectRef>
+          <a:fontRef idx="minor">
+            <a:schemeClr val="lt1"/>
+          </a:fontRef>
+        </p:style>
+        <p:txBody>
+          <a:bodyPr rtlCol="0" anchor="ctr"/>
+          <a:lstStyle/>
+          <a:p>
+            <a:pPr algn="ctr"/>
+            <a:endParaRPr lang="en-US"/>
+          </a:p>
+        </p:txBody>
+      </p:sp>
+      <p:sp>
+        <p:nvSpPr>
+          <p:cNvPr id="2" name="Oval 1"/>
+          <p:cNvSpPr/>
+          <p:nvPr/>
+        </p:nvSpPr>
+        <p:spPr>
+          <a:xfrm>
+            <a:off x="4720770" y="5172501"/>
+            <a:ext cx="2611104" cy="1214651"/>
+          </a:xfrm>
+          <a:prstGeom prst="ellipse">
+            <a:avLst/>
+          </a:prstGeom>
+          <a:noFill/>
+          <a:ln>
+            <a:noFill/>
+          </a:ln>
+        </p:spPr>
+        <p:style>
+          <a:lnRef idx="2">
+            <a:schemeClr val="accent1">
+              <a:shade val="50000"/>
+            </a:schemeClr>
+          </a:lnRef>
+          <a:fillRef idx="1">
+            <a:schemeClr val="accent1"/>
+          </a:fillRef>
+          <a:effectRef idx="0">
+            <a:schemeClr val="accent1"/>
+          </a:effectRef>
+          <a:fontRef idx="minor">
+            <a:schemeClr val="lt1"/>
+          </a:fontRef>
+        </p:style>
+        <p:txBody>
+          <a:bodyPr rtlCol="0" anchor="ctr"/>
+          <a:lstStyle/>
+          <a:p>
+            <a:pPr algn="ctr"/>
+            <a:r>
+              <a:rPr lang="en-US" dirty="0" smtClean="0">
+                <a:solidFill>
+                  <a:schemeClr val="bg1">
+                    <a:lumMod val="50000"/>
+                  </a:schemeClr>
+                </a:solidFill>
+              </a:rPr>
+              <a:t>Your customized card here …</a:t>
+            </a:r>
+            <a:endParaRPr lang="en-US" dirty="0">
+              <a:solidFill>
+                <a:schemeClr val="bg1">
+                  <a:lumMod val="50000"/>
+                </a:schemeClr>
+              </a:solidFill>
+            </a:endParaRPr>
+          </a:p>
+        </p:txBody>
+      </p:sp>
     </p:spTree>
     <p:extLst>
       <p:ext uri="{BB962C8B-B14F-4D97-AF65-F5344CB8AC3E}">

</xml_diff>

<commit_message>
update modal to use lead details
</commit_message>
<xml_diff>
--- a/data/mockups.pptx
+++ b/data/mockups.pptx
@@ -6,6 +6,7 @@
   </p:sldMasterIdLst>
   <p:sldIdLst>
     <p:sldId id="256" r:id="rId2"/>
+    <p:sldId id="257" r:id="rId3"/>
   </p:sldIdLst>
   <p:sldSz cx="12192000" cy="6858000"/>
   <p:notesSz cx="6858000" cy="9144000"/>
@@ -254,7 +255,7 @@
           <a:p>
             <a:fld id="{60287405-953B-4349-A719-48CAA62A9407}" type="datetimeFigureOut">
               <a:rPr lang="en-US" smtClean="0"/>
-              <a:t>8/19/2014</a:t>
+              <a:t>8/21/2014</a:t>
             </a:fld>
             <a:endParaRPr lang="en-US"/>
           </a:p>
@@ -424,7 +425,7 @@
           <a:p>
             <a:fld id="{60287405-953B-4349-A719-48CAA62A9407}" type="datetimeFigureOut">
               <a:rPr lang="en-US" smtClean="0"/>
-              <a:t>8/19/2014</a:t>
+              <a:t>8/21/2014</a:t>
             </a:fld>
             <a:endParaRPr lang="en-US"/>
           </a:p>
@@ -604,7 +605,7 @@
           <a:p>
             <a:fld id="{60287405-953B-4349-A719-48CAA62A9407}" type="datetimeFigureOut">
               <a:rPr lang="en-US" smtClean="0"/>
-              <a:t>8/19/2014</a:t>
+              <a:t>8/21/2014</a:t>
             </a:fld>
             <a:endParaRPr lang="en-US"/>
           </a:p>
@@ -774,7 +775,7 @@
           <a:p>
             <a:fld id="{60287405-953B-4349-A719-48CAA62A9407}" type="datetimeFigureOut">
               <a:rPr lang="en-US" smtClean="0"/>
-              <a:t>8/19/2014</a:t>
+              <a:t>8/21/2014</a:t>
             </a:fld>
             <a:endParaRPr lang="en-US"/>
           </a:p>
@@ -1020,7 +1021,7 @@
           <a:p>
             <a:fld id="{60287405-953B-4349-A719-48CAA62A9407}" type="datetimeFigureOut">
               <a:rPr lang="en-US" smtClean="0"/>
-              <a:t>8/19/2014</a:t>
+              <a:t>8/21/2014</a:t>
             </a:fld>
             <a:endParaRPr lang="en-US"/>
           </a:p>
@@ -1252,7 +1253,7 @@
           <a:p>
             <a:fld id="{60287405-953B-4349-A719-48CAA62A9407}" type="datetimeFigureOut">
               <a:rPr lang="en-US" smtClean="0"/>
-              <a:t>8/19/2014</a:t>
+              <a:t>8/21/2014</a:t>
             </a:fld>
             <a:endParaRPr lang="en-US"/>
           </a:p>
@@ -1619,7 +1620,7 @@
           <a:p>
             <a:fld id="{60287405-953B-4349-A719-48CAA62A9407}" type="datetimeFigureOut">
               <a:rPr lang="en-US" smtClean="0"/>
-              <a:t>8/19/2014</a:t>
+              <a:t>8/21/2014</a:t>
             </a:fld>
             <a:endParaRPr lang="en-US"/>
           </a:p>
@@ -1737,7 +1738,7 @@
           <a:p>
             <a:fld id="{60287405-953B-4349-A719-48CAA62A9407}" type="datetimeFigureOut">
               <a:rPr lang="en-US" smtClean="0"/>
-              <a:t>8/19/2014</a:t>
+              <a:t>8/21/2014</a:t>
             </a:fld>
             <a:endParaRPr lang="en-US"/>
           </a:p>
@@ -1832,7 +1833,7 @@
           <a:p>
             <a:fld id="{60287405-953B-4349-A719-48CAA62A9407}" type="datetimeFigureOut">
               <a:rPr lang="en-US" smtClean="0"/>
-              <a:t>8/19/2014</a:t>
+              <a:t>8/21/2014</a:t>
             </a:fld>
             <a:endParaRPr lang="en-US"/>
           </a:p>
@@ -2109,7 +2110,7 @@
           <a:p>
             <a:fld id="{60287405-953B-4349-A719-48CAA62A9407}" type="datetimeFigureOut">
               <a:rPr lang="en-US" smtClean="0"/>
-              <a:t>8/19/2014</a:t>
+              <a:t>8/21/2014</a:t>
             </a:fld>
             <a:endParaRPr lang="en-US"/>
           </a:p>
@@ -2362,7 +2363,7 @@
           <a:p>
             <a:fld id="{60287405-953B-4349-A719-48CAA62A9407}" type="datetimeFigureOut">
               <a:rPr lang="en-US" smtClean="0"/>
-              <a:t>8/19/2014</a:t>
+              <a:t>8/21/2014</a:t>
             </a:fld>
             <a:endParaRPr lang="en-US"/>
           </a:p>
@@ -2575,7 +2576,7 @@
           <a:p>
             <a:fld id="{60287405-953B-4349-A719-48CAA62A9407}" type="datetimeFigureOut">
               <a:rPr lang="en-US" smtClean="0"/>
-              <a:t>8/19/2014</a:t>
+              <a:t>8/21/2014</a:t>
             </a:fld>
             <a:endParaRPr lang="en-US"/>
           </a:p>
@@ -4548,6 +4549,1550 @@
 </p:sld>
 </file>
 
+<file path=ppt/slides/slide2.xml><?xml version="1.0" encoding="utf-8"?>
+<p:sld xmlns:a="http://schemas.openxmlformats.org/drawingml/2006/main" xmlns:r="http://schemas.openxmlformats.org/officeDocument/2006/relationships" xmlns:p="http://schemas.openxmlformats.org/presentationml/2006/main">
+  <p:cSld>
+    <p:spTree>
+      <p:nvGrpSpPr>
+        <p:cNvPr id="1" name=""/>
+        <p:cNvGrpSpPr/>
+        <p:nvPr/>
+      </p:nvGrpSpPr>
+      <p:grpSpPr>
+        <a:xfrm>
+          <a:off x="0" y="0"/>
+          <a:ext cx="0" cy="0"/>
+          <a:chOff x="0" y="0"/>
+          <a:chExt cx="0" cy="0"/>
+        </a:xfrm>
+      </p:grpSpPr>
+      <p:sp>
+        <p:nvSpPr>
+          <p:cNvPr id="5" name="Rectangle 4"/>
+          <p:cNvSpPr/>
+          <p:nvPr/>
+        </p:nvSpPr>
+        <p:spPr>
+          <a:xfrm>
+            <a:off x="580572" y="1030515"/>
+            <a:ext cx="3323772" cy="1814286"/>
+          </a:xfrm>
+          <a:prstGeom prst="rect">
+            <a:avLst/>
+          </a:prstGeom>
+          <a:solidFill>
+            <a:schemeClr val="bg1"/>
+          </a:solidFill>
+          <a:ln>
+            <a:solidFill>
+              <a:schemeClr val="bg1">
+                <a:lumMod val="65000"/>
+              </a:schemeClr>
+            </a:solidFill>
+          </a:ln>
+        </p:spPr>
+        <p:style>
+          <a:lnRef idx="2">
+            <a:schemeClr val="accent1">
+              <a:shade val="50000"/>
+            </a:schemeClr>
+          </a:lnRef>
+          <a:fillRef idx="1">
+            <a:schemeClr val="accent1"/>
+          </a:fillRef>
+          <a:effectRef idx="0">
+            <a:schemeClr val="accent1"/>
+          </a:effectRef>
+          <a:fontRef idx="minor">
+            <a:schemeClr val="lt1"/>
+          </a:fontRef>
+        </p:style>
+        <p:txBody>
+          <a:bodyPr rtlCol="0" anchor="ctr"/>
+          <a:lstStyle/>
+          <a:p>
+            <a:pPr algn="ctr"/>
+            <a:endParaRPr lang="en-US" dirty="0"/>
+          </a:p>
+        </p:txBody>
+      </p:sp>
+      <p:pic>
+        <p:nvPicPr>
+          <p:cNvPr id="17" name="Picture 16"/>
+          <p:cNvPicPr>
+            <a:picLocks noChangeAspect="1"/>
+          </p:cNvPicPr>
+          <p:nvPr/>
+        </p:nvPicPr>
+        <p:blipFill>
+          <a:blip r:embed="rId2" cstate="print">
+            <a:extLst>
+              <a:ext uri="{28A0092B-C50C-407E-A947-70E740481C1C}">
+                <a14:useLocalDpi xmlns:a14="http://schemas.microsoft.com/office/drawing/2010/main" val="0"/>
+              </a:ext>
+            </a:extLst>
+          </a:blip>
+          <a:stretch>
+            <a:fillRect/>
+          </a:stretch>
+        </p:blipFill>
+        <p:spPr>
+          <a:xfrm>
+            <a:off x="638628" y="1088571"/>
+            <a:ext cx="914400" cy="914400"/>
+          </a:xfrm>
+          <a:prstGeom prst="rect">
+            <a:avLst/>
+          </a:prstGeom>
+        </p:spPr>
+      </p:pic>
+      <p:pic>
+        <p:nvPicPr>
+          <p:cNvPr id="18" name="Picture 17"/>
+          <p:cNvPicPr>
+            <a:picLocks noChangeAspect="1"/>
+          </p:cNvPicPr>
+          <p:nvPr/>
+        </p:nvPicPr>
+        <p:blipFill>
+          <a:blip r:embed="rId3" cstate="print">
+            <a:extLst>
+              <a:ext uri="{28A0092B-C50C-407E-A947-70E740481C1C}">
+                <a14:useLocalDpi xmlns:a14="http://schemas.microsoft.com/office/drawing/2010/main" val="0"/>
+              </a:ext>
+            </a:extLst>
+          </a:blip>
+          <a:stretch>
+            <a:fillRect/>
+          </a:stretch>
+        </p:blipFill>
+        <p:spPr>
+          <a:xfrm>
+            <a:off x="730068" y="2058126"/>
+            <a:ext cx="731520" cy="731520"/>
+          </a:xfrm>
+          <a:prstGeom prst="rect">
+            <a:avLst/>
+          </a:prstGeom>
+        </p:spPr>
+      </p:pic>
+      <p:grpSp>
+        <p:nvGrpSpPr>
+          <p:cNvPr id="56" name="Group 55"/>
+          <p:cNvGrpSpPr/>
+          <p:nvPr/>
+        </p:nvGrpSpPr>
+        <p:grpSpPr>
+          <a:xfrm>
+            <a:off x="4434114" y="2960910"/>
+            <a:ext cx="3323772" cy="1814286"/>
+            <a:chOff x="8287656" y="1030515"/>
+            <a:chExt cx="3323772" cy="1814286"/>
+          </a:xfrm>
+        </p:grpSpPr>
+        <p:pic>
+          <p:nvPicPr>
+            <p:cNvPr id="25" name="Picture 24"/>
+            <p:cNvPicPr>
+              <a:picLocks noChangeAspect="1"/>
+            </p:cNvPicPr>
+            <p:nvPr/>
+          </p:nvPicPr>
+          <p:blipFill rotWithShape="1">
+            <a:blip r:embed="rId4">
+              <a:extLst>
+                <a:ext uri="{28A0092B-C50C-407E-A947-70E740481C1C}">
+                  <a14:useLocalDpi xmlns:a14="http://schemas.microsoft.com/office/drawing/2010/main" val="0"/>
+                </a:ext>
+              </a:extLst>
+            </a:blip>
+            <a:srcRect t="9028" r="5249" b="53576"/>
+            <a:stretch/>
+          </p:blipFill>
+          <p:spPr>
+            <a:xfrm>
+              <a:off x="8403768" y="1614161"/>
+              <a:ext cx="3077032" cy="1172582"/>
+            </a:xfrm>
+            <a:prstGeom prst="rect">
+              <a:avLst/>
+            </a:prstGeom>
+          </p:spPr>
+        </p:pic>
+        <p:pic>
+          <p:nvPicPr>
+            <p:cNvPr id="16" name="Picture 15"/>
+            <p:cNvPicPr>
+              <a:picLocks noChangeAspect="1"/>
+            </p:cNvPicPr>
+            <p:nvPr/>
+          </p:nvPicPr>
+          <p:blipFill>
+            <a:blip r:embed="rId5" cstate="print">
+              <a:extLst>
+                <a:ext uri="{28A0092B-C50C-407E-A947-70E740481C1C}">
+                  <a14:useLocalDpi xmlns:a14="http://schemas.microsoft.com/office/drawing/2010/main" val="0"/>
+                </a:ext>
+              </a:extLst>
+            </a:blip>
+            <a:stretch>
+              <a:fillRect/>
+            </a:stretch>
+          </p:blipFill>
+          <p:spPr>
+            <a:xfrm>
+              <a:off x="8345712" y="1088571"/>
+              <a:ext cx="457200" cy="457200"/>
+            </a:xfrm>
+            <a:prstGeom prst="rect">
+              <a:avLst/>
+            </a:prstGeom>
+          </p:spPr>
+        </p:pic>
+        <p:sp>
+          <p:nvSpPr>
+            <p:cNvPr id="13" name="Rectangle 12"/>
+            <p:cNvSpPr/>
+            <p:nvPr/>
+          </p:nvSpPr>
+          <p:spPr>
+            <a:xfrm>
+              <a:off x="8287656" y="1030515"/>
+              <a:ext cx="3323772" cy="1814286"/>
+            </a:xfrm>
+            <a:prstGeom prst="rect">
+              <a:avLst/>
+            </a:prstGeom>
+            <a:noFill/>
+            <a:ln>
+              <a:solidFill>
+                <a:schemeClr val="bg1">
+                  <a:lumMod val="65000"/>
+                </a:schemeClr>
+              </a:solidFill>
+            </a:ln>
+          </p:spPr>
+          <p:style>
+            <a:lnRef idx="2">
+              <a:schemeClr val="accent1">
+                <a:shade val="50000"/>
+              </a:schemeClr>
+            </a:lnRef>
+            <a:fillRef idx="1">
+              <a:schemeClr val="accent1"/>
+            </a:fillRef>
+            <a:effectRef idx="0">
+              <a:schemeClr val="accent1"/>
+            </a:effectRef>
+            <a:fontRef idx="minor">
+              <a:schemeClr val="lt1"/>
+            </a:fontRef>
+          </p:style>
+          <p:txBody>
+            <a:bodyPr rtlCol="0" anchor="ctr"/>
+            <a:lstStyle/>
+            <a:p>
+              <a:pPr algn="ctr"/>
+              <a:endParaRPr lang="en-US"/>
+            </a:p>
+          </p:txBody>
+        </p:sp>
+        <p:sp>
+          <p:nvSpPr>
+            <p:cNvPr id="28" name="TextBox 27"/>
+            <p:cNvSpPr txBox="1"/>
+            <p:nvPr/>
+          </p:nvSpPr>
+          <p:spPr>
+            <a:xfrm>
+              <a:off x="9230522" y="1063178"/>
+              <a:ext cx="1391599" cy="461665"/>
+            </a:xfrm>
+            <a:prstGeom prst="rect">
+              <a:avLst/>
+            </a:prstGeom>
+            <a:noFill/>
+          </p:spPr>
+          <p:txBody>
+            <a:bodyPr wrap="none" rtlCol="0">
+              <a:spAutoFit/>
+            </a:bodyPr>
+            <a:lstStyle/>
+            <a:p>
+              <a:r>
+                <a:rPr lang="en-US" sz="2400" dirty="0" smtClean="0"/>
+                <a:t>Microsoft</a:t>
+              </a:r>
+              <a:endParaRPr lang="en-US" sz="2400" dirty="0"/>
+            </a:p>
+          </p:txBody>
+        </p:sp>
+        <p:sp>
+          <p:nvSpPr>
+            <p:cNvPr id="29" name="TextBox 28"/>
+            <p:cNvSpPr txBox="1"/>
+            <p:nvPr/>
+          </p:nvSpPr>
+          <p:spPr>
+            <a:xfrm>
+              <a:off x="9994360" y="1318546"/>
+              <a:ext cx="883640" cy="523220"/>
+            </a:xfrm>
+            <a:prstGeom prst="rect">
+              <a:avLst/>
+            </a:prstGeom>
+            <a:noFill/>
+          </p:spPr>
+          <p:txBody>
+            <a:bodyPr wrap="none" rtlCol="0">
+              <a:spAutoFit/>
+            </a:bodyPr>
+            <a:lstStyle/>
+            <a:p>
+              <a:r>
+                <a:rPr lang="en-US" sz="2800" dirty="0" smtClean="0"/>
+                <a:t>MVC</a:t>
+              </a:r>
+              <a:endParaRPr lang="en-US" sz="2800" dirty="0"/>
+            </a:p>
+          </p:txBody>
+        </p:sp>
+        <p:sp>
+          <p:nvSpPr>
+            <p:cNvPr id="30" name="TextBox 29"/>
+            <p:cNvSpPr txBox="1"/>
+            <p:nvPr/>
+          </p:nvSpPr>
+          <p:spPr>
+            <a:xfrm>
+              <a:off x="10702271" y="1100832"/>
+              <a:ext cx="662361" cy="369332"/>
+            </a:xfrm>
+            <a:prstGeom prst="rect">
+              <a:avLst/>
+            </a:prstGeom>
+            <a:noFill/>
+          </p:spPr>
+          <p:txBody>
+            <a:bodyPr wrap="none" rtlCol="0">
+              <a:spAutoFit/>
+            </a:bodyPr>
+            <a:lstStyle/>
+            <a:p>
+              <a:r>
+                <a:rPr lang="en-US" dirty="0" smtClean="0">
+                  <a:solidFill>
+                    <a:schemeClr val="bg1">
+                      <a:lumMod val="50000"/>
+                    </a:schemeClr>
+                  </a:solidFill>
+                </a:rPr>
+                <a:t>Cabo</a:t>
+              </a:r>
+              <a:endParaRPr lang="en-US" dirty="0">
+                <a:solidFill>
+                  <a:schemeClr val="bg1">
+                    <a:lumMod val="50000"/>
+                  </a:schemeClr>
+                </a:solidFill>
+              </a:endParaRPr>
+            </a:p>
+          </p:txBody>
+        </p:sp>
+        <p:sp>
+          <p:nvSpPr>
+            <p:cNvPr id="31" name="TextBox 30"/>
+            <p:cNvSpPr txBox="1"/>
+            <p:nvPr/>
+          </p:nvSpPr>
+          <p:spPr>
+            <a:xfrm>
+              <a:off x="10398561" y="1612271"/>
+              <a:ext cx="1138517" cy="400110"/>
+            </a:xfrm>
+            <a:prstGeom prst="rect">
+              <a:avLst/>
+            </a:prstGeom>
+            <a:noFill/>
+          </p:spPr>
+          <p:txBody>
+            <a:bodyPr wrap="none" rtlCol="0">
+              <a:spAutoFit/>
+            </a:bodyPr>
+            <a:lstStyle/>
+            <a:p>
+              <a:r>
+                <a:rPr lang="en-US" sz="2000" dirty="0" smtClean="0">
+                  <a:solidFill>
+                    <a:schemeClr val="tx1">
+                      <a:lumMod val="65000"/>
+                      <a:lumOff val="35000"/>
+                    </a:schemeClr>
+                  </a:solidFill>
+                </a:rPr>
+                <a:t>Germany</a:t>
+              </a:r>
+              <a:endParaRPr lang="en-US" sz="2000" dirty="0">
+                <a:solidFill>
+                  <a:schemeClr val="tx1">
+                    <a:lumMod val="65000"/>
+                    <a:lumOff val="35000"/>
+                  </a:schemeClr>
+                </a:solidFill>
+              </a:endParaRPr>
+            </a:p>
+          </p:txBody>
+        </p:sp>
+      </p:grpSp>
+      <p:grpSp>
+        <p:nvGrpSpPr>
+          <p:cNvPr id="55" name="Group 54"/>
+          <p:cNvGrpSpPr/>
+          <p:nvPr/>
+        </p:nvGrpSpPr>
+        <p:grpSpPr>
+          <a:xfrm>
+            <a:off x="4434114" y="1030515"/>
+            <a:ext cx="3323772" cy="1814286"/>
+            <a:chOff x="4434114" y="1030515"/>
+            <a:chExt cx="3323772" cy="1814286"/>
+          </a:xfrm>
+        </p:grpSpPr>
+        <p:sp>
+          <p:nvSpPr>
+            <p:cNvPr id="11" name="Rectangle 10"/>
+            <p:cNvSpPr/>
+            <p:nvPr/>
+          </p:nvSpPr>
+          <p:spPr>
+            <a:xfrm>
+              <a:off x="4434114" y="1030515"/>
+              <a:ext cx="3323772" cy="1814286"/>
+            </a:xfrm>
+            <a:prstGeom prst="rect">
+              <a:avLst/>
+            </a:prstGeom>
+            <a:solidFill>
+              <a:schemeClr val="bg1"/>
+            </a:solidFill>
+            <a:ln>
+              <a:solidFill>
+                <a:schemeClr val="bg1">
+                  <a:lumMod val="65000"/>
+                </a:schemeClr>
+              </a:solidFill>
+            </a:ln>
+          </p:spPr>
+          <p:style>
+            <a:lnRef idx="2">
+              <a:schemeClr val="accent1">
+                <a:shade val="50000"/>
+              </a:schemeClr>
+            </a:lnRef>
+            <a:fillRef idx="1">
+              <a:schemeClr val="accent1"/>
+            </a:fillRef>
+            <a:effectRef idx="0">
+              <a:schemeClr val="accent1"/>
+            </a:effectRef>
+            <a:fontRef idx="minor">
+              <a:schemeClr val="lt1"/>
+            </a:fontRef>
+          </p:style>
+          <p:txBody>
+            <a:bodyPr rtlCol="0" anchor="ctr"/>
+            <a:lstStyle/>
+            <a:p>
+              <a:pPr algn="ctr"/>
+              <a:endParaRPr lang="en-US"/>
+            </a:p>
+          </p:txBody>
+        </p:sp>
+        <p:pic>
+          <p:nvPicPr>
+            <p:cNvPr id="15" name="Picture 14"/>
+            <p:cNvPicPr>
+              <a:picLocks noChangeAspect="1"/>
+            </p:cNvPicPr>
+            <p:nvPr/>
+          </p:nvPicPr>
+          <p:blipFill>
+            <a:blip r:embed="rId6" cstate="print">
+              <a:clrChange>
+                <a:clrFrom>
+                  <a:srgbClr val="000000">
+                    <a:alpha val="0"/>
+                  </a:srgbClr>
+                </a:clrFrom>
+                <a:clrTo>
+                  <a:srgbClr val="000000">
+                    <a:alpha val="0"/>
+                  </a:srgbClr>
+                </a:clrTo>
+              </a:clrChange>
+              <a:extLst>
+                <a:ext uri="{28A0092B-C50C-407E-A947-70E740481C1C}">
+                  <a14:useLocalDpi xmlns:a14="http://schemas.microsoft.com/office/drawing/2010/main" val="0"/>
+                </a:ext>
+              </a:extLst>
+            </a:blip>
+            <a:stretch>
+              <a:fillRect/>
+            </a:stretch>
+          </p:blipFill>
+          <p:spPr>
+            <a:xfrm>
+              <a:off x="4492170" y="1088571"/>
+              <a:ext cx="457200" cy="457200"/>
+            </a:xfrm>
+            <a:prstGeom prst="rect">
+              <a:avLst/>
+            </a:prstGeom>
+          </p:spPr>
+        </p:pic>
+        <p:pic>
+          <p:nvPicPr>
+            <p:cNvPr id="32" name="Picture 31"/>
+            <p:cNvPicPr>
+              <a:picLocks noChangeAspect="1"/>
+            </p:cNvPicPr>
+            <p:nvPr/>
+          </p:nvPicPr>
+          <p:blipFill rotWithShape="1">
+            <a:blip r:embed="rId7">
+              <a:extLst>
+                <a:ext uri="{28A0092B-C50C-407E-A947-70E740481C1C}">
+                  <a14:useLocalDpi xmlns:a14="http://schemas.microsoft.com/office/drawing/2010/main" val="0"/>
+                </a:ext>
+              </a:extLst>
+            </a:blip>
+            <a:srcRect t="30952" b="12662"/>
+            <a:stretch/>
+          </p:blipFill>
+          <p:spPr>
+            <a:xfrm>
+              <a:off x="4600165" y="1634394"/>
+              <a:ext cx="3062058" cy="1137835"/>
+            </a:xfrm>
+            <a:prstGeom prst="rect">
+              <a:avLst/>
+            </a:prstGeom>
+          </p:spPr>
+        </p:pic>
+      </p:grpSp>
+      <p:sp>
+        <p:nvSpPr>
+          <p:cNvPr id="34" name="TextBox 33"/>
+          <p:cNvSpPr txBox="1"/>
+          <p:nvPr/>
+        </p:nvSpPr>
+        <p:spPr>
+          <a:xfrm>
+            <a:off x="1625599" y="1055155"/>
+            <a:ext cx="2263772" cy="1815882"/>
+          </a:xfrm>
+          <a:prstGeom prst="rect">
+            <a:avLst/>
+          </a:prstGeom>
+          <a:noFill/>
+        </p:spPr>
+        <p:txBody>
+          <a:bodyPr wrap="square" rtlCol="0">
+            <a:spAutoFit/>
+          </a:bodyPr>
+          <a:lstStyle/>
+          <a:p>
+            <a:r>
+              <a:rPr lang="en-US" sz="1600" b="1" dirty="0" smtClean="0"/>
+              <a:t>John Doe</a:t>
+            </a:r>
+          </a:p>
+          <a:p>
+            <a:r>
+              <a:rPr lang="en-US" sz="1600" dirty="0" smtClean="0"/>
+              <a:t>Senior Account Manager</a:t>
+            </a:r>
+          </a:p>
+          <a:p>
+            <a:r>
+              <a:rPr lang="en-US" sz="1600" dirty="0" smtClean="0"/>
+              <a:t>General Electric</a:t>
+            </a:r>
+          </a:p>
+          <a:p>
+            <a:r>
+              <a:rPr lang="en-US" sz="1600" dirty="0" smtClean="0"/>
+              <a:t>Joined company in 2012</a:t>
+            </a:r>
+          </a:p>
+          <a:p>
+            <a:endParaRPr lang="en-US" sz="1600" dirty="0" smtClean="0"/>
+          </a:p>
+          <a:p>
+            <a:endParaRPr lang="en-US" sz="1600" dirty="0" smtClean="0"/>
+          </a:p>
+          <a:p>
+            <a:r>
+              <a:rPr lang="en-US" sz="1600" dirty="0" smtClean="0"/>
+              <a:t>Cincinnati, OH</a:t>
+            </a:r>
+          </a:p>
+        </p:txBody>
+      </p:sp>
+      <p:pic>
+        <p:nvPicPr>
+          <p:cNvPr id="38" name="Picture 37"/>
+          <p:cNvPicPr>
+            <a:picLocks noChangeAspect="1"/>
+          </p:cNvPicPr>
+          <p:nvPr/>
+        </p:nvPicPr>
+        <p:blipFill>
+          <a:blip r:embed="rId8">
+            <a:extLst>
+              <a:ext uri="{28A0092B-C50C-407E-A947-70E740481C1C}">
+                <a14:useLocalDpi xmlns:a14="http://schemas.microsoft.com/office/drawing/2010/main" val="0"/>
+              </a:ext>
+            </a:extLst>
+          </a:blip>
+          <a:stretch>
+            <a:fillRect/>
+          </a:stretch>
+        </p:blipFill>
+        <p:spPr>
+          <a:xfrm>
+            <a:off x="3260727" y="2396953"/>
+            <a:ext cx="460966" cy="460966"/>
+          </a:xfrm>
+          <a:prstGeom prst="rect">
+            <a:avLst/>
+          </a:prstGeom>
+        </p:spPr>
+      </p:pic>
+      <p:sp>
+        <p:nvSpPr>
+          <p:cNvPr id="39" name="TextBox 38"/>
+          <p:cNvSpPr txBox="1"/>
+          <p:nvPr/>
+        </p:nvSpPr>
+        <p:spPr>
+          <a:xfrm>
+            <a:off x="3549255" y="2396953"/>
+            <a:ext cx="425116" cy="261610"/>
+          </a:xfrm>
+          <a:prstGeom prst="rect">
+            <a:avLst/>
+          </a:prstGeom>
+          <a:noFill/>
+        </p:spPr>
+        <p:txBody>
+          <a:bodyPr wrap="none" rtlCol="0">
+            <a:spAutoFit/>
+          </a:bodyPr>
+          <a:lstStyle/>
+          <a:p>
+            <a:r>
+              <a:rPr lang="en-US" sz="1100" dirty="0" smtClean="0"/>
+              <a:t>70 F</a:t>
+            </a:r>
+            <a:endParaRPr lang="en-US" sz="1100" dirty="0"/>
+          </a:p>
+        </p:txBody>
+      </p:sp>
+      <p:grpSp>
+        <p:nvGrpSpPr>
+          <p:cNvPr id="57" name="Group 56"/>
+          <p:cNvGrpSpPr/>
+          <p:nvPr/>
+        </p:nvGrpSpPr>
+        <p:grpSpPr>
+          <a:xfrm>
+            <a:off x="580572" y="2960910"/>
+            <a:ext cx="3323772" cy="1814286"/>
+            <a:chOff x="580572" y="2960910"/>
+            <a:chExt cx="3323772" cy="1814286"/>
+          </a:xfrm>
+        </p:grpSpPr>
+        <p:sp>
+          <p:nvSpPr>
+            <p:cNvPr id="40" name="Rectangle 39"/>
+            <p:cNvSpPr/>
+            <p:nvPr/>
+          </p:nvSpPr>
+          <p:spPr>
+            <a:xfrm>
+              <a:off x="580572" y="2960910"/>
+              <a:ext cx="3323772" cy="1814286"/>
+            </a:xfrm>
+            <a:prstGeom prst="rect">
+              <a:avLst/>
+            </a:prstGeom>
+            <a:solidFill>
+              <a:schemeClr val="bg1"/>
+            </a:solidFill>
+            <a:ln>
+              <a:solidFill>
+                <a:schemeClr val="bg1">
+                  <a:lumMod val="65000"/>
+                </a:schemeClr>
+              </a:solidFill>
+            </a:ln>
+          </p:spPr>
+          <p:style>
+            <a:lnRef idx="2">
+              <a:schemeClr val="accent1">
+                <a:shade val="50000"/>
+              </a:schemeClr>
+            </a:lnRef>
+            <a:fillRef idx="1">
+              <a:schemeClr val="accent1"/>
+            </a:fillRef>
+            <a:effectRef idx="0">
+              <a:schemeClr val="accent1"/>
+            </a:effectRef>
+            <a:fontRef idx="minor">
+              <a:schemeClr val="lt1"/>
+            </a:fontRef>
+          </p:style>
+          <p:txBody>
+            <a:bodyPr rtlCol="0" anchor="ctr"/>
+            <a:lstStyle/>
+            <a:p>
+              <a:pPr algn="ctr"/>
+              <a:endParaRPr lang="en-US"/>
+            </a:p>
+          </p:txBody>
+        </p:sp>
+        <p:sp>
+          <p:nvSpPr>
+            <p:cNvPr id="42" name="TextBox 41"/>
+            <p:cNvSpPr txBox="1"/>
+            <p:nvPr/>
+          </p:nvSpPr>
+          <p:spPr>
+            <a:xfrm>
+              <a:off x="1095827" y="3022596"/>
+              <a:ext cx="2793544" cy="1643742"/>
+            </a:xfrm>
+            <a:prstGeom prst="rect">
+              <a:avLst/>
+            </a:prstGeom>
+            <a:noFill/>
+          </p:spPr>
+          <p:txBody>
+            <a:bodyPr wrap="square" rtlCol="0">
+              <a:noAutofit/>
+            </a:bodyPr>
+            <a:lstStyle/>
+            <a:p>
+              <a:pPr marL="231775" indent="-231775">
+                <a:buFont typeface="Arial" panose="020B0604020202020204" pitchFamily="34" charset="0"/>
+                <a:buChar char="•"/>
+              </a:pPr>
+              <a:r>
+                <a:rPr lang="en-US" sz="1600" dirty="0" smtClean="0"/>
+                <a:t>Reports to </a:t>
+              </a:r>
+              <a:r>
+                <a:rPr lang="en-US" sz="1600" dirty="0" smtClean="0">
+                  <a:hlinkClick r:id="rId9"/>
+                </a:rPr>
+                <a:t>Barbara Watkins</a:t>
+              </a:r>
+              <a:r>
+                <a:rPr lang="en-US" sz="1600" dirty="0" smtClean="0"/>
+                <a:t>, Director of Enterprise</a:t>
+              </a:r>
+            </a:p>
+            <a:p>
+              <a:pPr marL="231775" indent="-231775">
+                <a:buFont typeface="Arial" panose="020B0604020202020204" pitchFamily="34" charset="0"/>
+                <a:buChar char="•"/>
+              </a:pPr>
+              <a:endParaRPr lang="en-US" sz="1100" dirty="0" smtClean="0"/>
+            </a:p>
+            <a:p>
+              <a:pPr marL="231775" indent="-231775">
+                <a:buFont typeface="Arial" panose="020B0604020202020204" pitchFamily="34" charset="0"/>
+                <a:buChar char="•"/>
+              </a:pPr>
+              <a:r>
+                <a:rPr lang="en-US" sz="1600" dirty="0" smtClean="0"/>
+                <a:t>Colleagues</a:t>
+              </a:r>
+            </a:p>
+            <a:p>
+              <a:pPr marL="465138" lvl="1" indent="-233363">
+                <a:buFont typeface="Arial" panose="020B0604020202020204" pitchFamily="34" charset="0"/>
+                <a:buChar char="•"/>
+              </a:pPr>
+              <a:r>
+                <a:rPr lang="en-US" sz="1600" dirty="0" smtClean="0">
+                  <a:hlinkClick r:id="rId9"/>
+                </a:rPr>
+                <a:t>Derek Watson</a:t>
+              </a:r>
+              <a:endParaRPr lang="en-US" sz="1600" dirty="0" smtClean="0"/>
+            </a:p>
+            <a:p>
+              <a:pPr marL="465138" lvl="1" indent="-233363">
+                <a:buFont typeface="Arial" panose="020B0604020202020204" pitchFamily="34" charset="0"/>
+                <a:buChar char="•"/>
+              </a:pPr>
+              <a:r>
+                <a:rPr lang="en-US" sz="1600" dirty="0" smtClean="0">
+                  <a:hlinkClick r:id="rId9"/>
+                </a:rPr>
+                <a:t>Pranav Shah</a:t>
+              </a:r>
+              <a:endParaRPr lang="en-US" sz="1600" dirty="0" smtClean="0"/>
+            </a:p>
+            <a:p>
+              <a:pPr marL="465138" lvl="1" indent="-233363">
+                <a:buFont typeface="Arial" panose="020B0604020202020204" pitchFamily="34" charset="0"/>
+                <a:buChar char="•"/>
+              </a:pPr>
+              <a:r>
+                <a:rPr lang="en-US" sz="1600" dirty="0" smtClean="0">
+                  <a:hlinkClick r:id="rId9"/>
+                </a:rPr>
+                <a:t>Nancy Kim</a:t>
+              </a:r>
+              <a:endParaRPr lang="en-US" sz="1600" dirty="0" smtClean="0"/>
+            </a:p>
+            <a:p>
+              <a:pPr marL="465138" lvl="1" indent="-233363">
+                <a:buFont typeface="Arial" panose="020B0604020202020204" pitchFamily="34" charset="0"/>
+                <a:buChar char="•"/>
+              </a:pPr>
+              <a:endParaRPr lang="en-US" sz="1600" dirty="0" smtClean="0"/>
+            </a:p>
+            <a:p>
+              <a:pPr marL="231775" indent="-231775">
+                <a:buFont typeface="Arial" panose="020B0604020202020204" pitchFamily="34" charset="0"/>
+                <a:buChar char="•"/>
+              </a:pPr>
+              <a:endParaRPr lang="en-US" sz="1600" dirty="0" smtClean="0"/>
+            </a:p>
+          </p:txBody>
+        </p:sp>
+        <p:pic>
+          <p:nvPicPr>
+            <p:cNvPr id="44" name="Picture 43"/>
+            <p:cNvPicPr>
+              <a:picLocks noChangeAspect="1"/>
+            </p:cNvPicPr>
+            <p:nvPr/>
+          </p:nvPicPr>
+          <p:blipFill>
+            <a:blip r:embed="rId10">
+              <a:extLst>
+                <a:ext uri="{28A0092B-C50C-407E-A947-70E740481C1C}">
+                  <a14:useLocalDpi xmlns:a14="http://schemas.microsoft.com/office/drawing/2010/main" val="0"/>
+                </a:ext>
+              </a:extLst>
+            </a:blip>
+            <a:stretch>
+              <a:fillRect/>
+            </a:stretch>
+          </p:blipFill>
+          <p:spPr>
+            <a:xfrm>
+              <a:off x="638627" y="3022596"/>
+              <a:ext cx="457200" cy="457200"/>
+            </a:xfrm>
+            <a:prstGeom prst="rect">
+              <a:avLst/>
+            </a:prstGeom>
+          </p:spPr>
+        </p:pic>
+      </p:grpSp>
+      <p:grpSp>
+        <p:nvGrpSpPr>
+          <p:cNvPr id="58" name="Group 57"/>
+          <p:cNvGrpSpPr/>
+          <p:nvPr/>
+        </p:nvGrpSpPr>
+        <p:grpSpPr>
+          <a:xfrm>
+            <a:off x="582466" y="4898562"/>
+            <a:ext cx="3323772" cy="1814286"/>
+            <a:chOff x="4434114" y="2960910"/>
+            <a:chExt cx="3323772" cy="1814286"/>
+          </a:xfrm>
+        </p:grpSpPr>
+        <p:sp>
+          <p:nvSpPr>
+            <p:cNvPr id="19" name="Rectangle 18"/>
+            <p:cNvSpPr/>
+            <p:nvPr/>
+          </p:nvSpPr>
+          <p:spPr>
+            <a:xfrm>
+              <a:off x="4434114" y="2960910"/>
+              <a:ext cx="3323772" cy="1814286"/>
+            </a:xfrm>
+            <a:prstGeom prst="rect">
+              <a:avLst/>
+            </a:prstGeom>
+            <a:solidFill>
+              <a:schemeClr val="bg1"/>
+            </a:solidFill>
+            <a:ln>
+              <a:solidFill>
+                <a:schemeClr val="bg1">
+                  <a:lumMod val="65000"/>
+                </a:schemeClr>
+              </a:solidFill>
+            </a:ln>
+          </p:spPr>
+          <p:style>
+            <a:lnRef idx="2">
+              <a:schemeClr val="accent1">
+                <a:shade val="50000"/>
+              </a:schemeClr>
+            </a:lnRef>
+            <a:fillRef idx="1">
+              <a:schemeClr val="accent1"/>
+            </a:fillRef>
+            <a:effectRef idx="0">
+              <a:schemeClr val="accent1"/>
+            </a:effectRef>
+            <a:fontRef idx="minor">
+              <a:schemeClr val="lt1"/>
+            </a:fontRef>
+          </p:style>
+          <p:txBody>
+            <a:bodyPr rtlCol="0" anchor="ctr"/>
+            <a:lstStyle/>
+            <a:p>
+              <a:pPr algn="ctr"/>
+              <a:endParaRPr lang="en-US"/>
+            </a:p>
+          </p:txBody>
+        </p:sp>
+        <p:pic>
+          <p:nvPicPr>
+            <p:cNvPr id="23" name="Picture 22"/>
+            <p:cNvPicPr>
+              <a:picLocks noChangeAspect="1"/>
+            </p:cNvPicPr>
+            <p:nvPr/>
+          </p:nvPicPr>
+          <p:blipFill>
+            <a:blip r:embed="rId11" cstate="print">
+              <a:extLst>
+                <a:ext uri="{28A0092B-C50C-407E-A947-70E740481C1C}">
+                  <a14:useLocalDpi xmlns:a14="http://schemas.microsoft.com/office/drawing/2010/main" val="0"/>
+                </a:ext>
+              </a:extLst>
+            </a:blip>
+            <a:stretch>
+              <a:fillRect/>
+            </a:stretch>
+          </p:blipFill>
+          <p:spPr>
+            <a:xfrm>
+              <a:off x="4477656" y="3022596"/>
+              <a:ext cx="457200" cy="457200"/>
+            </a:xfrm>
+            <a:prstGeom prst="rect">
+              <a:avLst/>
+            </a:prstGeom>
+          </p:spPr>
+        </p:pic>
+        <p:pic>
+          <p:nvPicPr>
+            <p:cNvPr id="47" name="Picture 46"/>
+            <p:cNvPicPr>
+              <a:picLocks noChangeAspect="1"/>
+            </p:cNvPicPr>
+            <p:nvPr/>
+          </p:nvPicPr>
+          <p:blipFill rotWithShape="1">
+            <a:blip r:embed="rId12"/>
+            <a:srcRect b="41666"/>
+            <a:stretch/>
+          </p:blipFill>
+          <p:spPr>
+            <a:xfrm>
+              <a:off x="4564971" y="3523338"/>
+              <a:ext cx="3008810" cy="1193804"/>
+            </a:xfrm>
+            <a:prstGeom prst="rect">
+              <a:avLst/>
+            </a:prstGeom>
+          </p:spPr>
+        </p:pic>
+      </p:grpSp>
+      <p:grpSp>
+        <p:nvGrpSpPr>
+          <p:cNvPr id="59" name="Group 58"/>
+          <p:cNvGrpSpPr/>
+          <p:nvPr/>
+        </p:nvGrpSpPr>
+        <p:grpSpPr>
+          <a:xfrm>
+            <a:off x="8215906" y="2960910"/>
+            <a:ext cx="3323772" cy="1814286"/>
+            <a:chOff x="8287656" y="2960910"/>
+            <a:chExt cx="3323772" cy="1814286"/>
+          </a:xfrm>
+        </p:grpSpPr>
+        <p:sp>
+          <p:nvSpPr>
+            <p:cNvPr id="21" name="Rectangle 20"/>
+            <p:cNvSpPr/>
+            <p:nvPr/>
+          </p:nvSpPr>
+          <p:spPr>
+            <a:xfrm>
+              <a:off x="8287656" y="2960910"/>
+              <a:ext cx="3323772" cy="1814286"/>
+            </a:xfrm>
+            <a:prstGeom prst="rect">
+              <a:avLst/>
+            </a:prstGeom>
+            <a:solidFill>
+              <a:schemeClr val="bg1"/>
+            </a:solidFill>
+            <a:ln>
+              <a:solidFill>
+                <a:schemeClr val="bg1">
+                  <a:lumMod val="65000"/>
+                </a:schemeClr>
+              </a:solidFill>
+            </a:ln>
+          </p:spPr>
+          <p:style>
+            <a:lnRef idx="2">
+              <a:schemeClr val="accent1">
+                <a:shade val="50000"/>
+              </a:schemeClr>
+            </a:lnRef>
+            <a:fillRef idx="1">
+              <a:schemeClr val="accent1"/>
+            </a:fillRef>
+            <a:effectRef idx="0">
+              <a:schemeClr val="accent1"/>
+            </a:effectRef>
+            <a:fontRef idx="minor">
+              <a:schemeClr val="lt1"/>
+            </a:fontRef>
+          </p:style>
+          <p:txBody>
+            <a:bodyPr rtlCol="0" anchor="ctr"/>
+            <a:lstStyle/>
+            <a:p>
+              <a:pPr algn="ctr"/>
+              <a:endParaRPr lang="en-US" dirty="0"/>
+            </a:p>
+          </p:txBody>
+        </p:sp>
+        <p:sp>
+          <p:nvSpPr>
+            <p:cNvPr id="50" name="TextBox 49"/>
+            <p:cNvSpPr txBox="1"/>
+            <p:nvPr/>
+          </p:nvSpPr>
+          <p:spPr>
+            <a:xfrm>
+              <a:off x="8381994" y="3022596"/>
+              <a:ext cx="3155084" cy="369332"/>
+            </a:xfrm>
+            <a:prstGeom prst="rect">
+              <a:avLst/>
+            </a:prstGeom>
+            <a:solidFill>
+              <a:schemeClr val="bg1">
+                <a:lumMod val="85000"/>
+              </a:schemeClr>
+            </a:solidFill>
+          </p:spPr>
+          <p:txBody>
+            <a:bodyPr wrap="square" rtlCol="0">
+              <a:spAutoFit/>
+            </a:bodyPr>
+            <a:lstStyle/>
+            <a:p>
+              <a:pPr algn="ctr"/>
+              <a:r>
+                <a:rPr lang="en-US" b="1" dirty="0" smtClean="0"/>
+                <a:t>Pain Points</a:t>
+              </a:r>
+              <a:endParaRPr lang="en-US" b="1" dirty="0"/>
+            </a:p>
+          </p:txBody>
+        </p:sp>
+        <p:sp>
+          <p:nvSpPr>
+            <p:cNvPr id="51" name="TextBox 50"/>
+            <p:cNvSpPr txBox="1"/>
+            <p:nvPr/>
+          </p:nvSpPr>
+          <p:spPr>
+            <a:xfrm>
+              <a:off x="8403768" y="3563719"/>
+              <a:ext cx="3133311" cy="1077218"/>
+            </a:xfrm>
+            <a:prstGeom prst="rect">
+              <a:avLst/>
+            </a:prstGeom>
+            <a:noFill/>
+          </p:spPr>
+          <p:txBody>
+            <a:bodyPr wrap="square" rtlCol="0">
+              <a:spAutoFit/>
+            </a:bodyPr>
+            <a:lstStyle/>
+            <a:p>
+              <a:pPr marL="285750" indent="-285750">
+                <a:buFont typeface="Arial" panose="020B0604020202020204" pitchFamily="34" charset="0"/>
+                <a:buChar char="•"/>
+              </a:pPr>
+              <a:r>
+                <a:rPr lang="en-US" sz="1600" dirty="0" smtClean="0"/>
+                <a:t>wall between Dev and IT Ops</a:t>
+              </a:r>
+            </a:p>
+            <a:p>
+              <a:pPr marL="285750" indent="-285750">
+                <a:buFont typeface="Arial" panose="020B0604020202020204" pitchFamily="34" charset="0"/>
+                <a:buChar char="•"/>
+              </a:pPr>
+              <a:r>
+                <a:rPr lang="en-US" sz="1600" dirty="0" smtClean="0"/>
+                <a:t>no end-to-end visibility</a:t>
+              </a:r>
+            </a:p>
+            <a:p>
+              <a:pPr marL="285750" indent="-285750">
+                <a:buFont typeface="Arial" panose="020B0604020202020204" pitchFamily="34" charset="0"/>
+                <a:buChar char="•"/>
+              </a:pPr>
+              <a:r>
+                <a:rPr lang="en-US" sz="1600" dirty="0" smtClean="0"/>
+                <a:t>continuous releases versus quality software </a:t>
+              </a:r>
+              <a:endParaRPr lang="en-US" sz="1600" dirty="0"/>
+            </a:p>
+          </p:txBody>
+        </p:sp>
+      </p:grpSp>
+      <p:grpSp>
+        <p:nvGrpSpPr>
+          <p:cNvPr id="61" name="Group 60"/>
+          <p:cNvGrpSpPr/>
+          <p:nvPr/>
+        </p:nvGrpSpPr>
+        <p:grpSpPr>
+          <a:xfrm>
+            <a:off x="8232259" y="4898562"/>
+            <a:ext cx="3323772" cy="1814286"/>
+            <a:chOff x="8287656" y="4891305"/>
+            <a:chExt cx="3323772" cy="1814286"/>
+          </a:xfrm>
+        </p:grpSpPr>
+        <p:sp>
+          <p:nvSpPr>
+            <p:cNvPr id="45" name="Rectangle 44"/>
+            <p:cNvSpPr/>
+            <p:nvPr/>
+          </p:nvSpPr>
+          <p:spPr>
+            <a:xfrm>
+              <a:off x="8287656" y="4891305"/>
+              <a:ext cx="3323772" cy="1814286"/>
+            </a:xfrm>
+            <a:prstGeom prst="rect">
+              <a:avLst/>
+            </a:prstGeom>
+            <a:solidFill>
+              <a:schemeClr val="bg1"/>
+            </a:solidFill>
+            <a:ln>
+              <a:solidFill>
+                <a:schemeClr val="bg1">
+                  <a:lumMod val="65000"/>
+                </a:schemeClr>
+              </a:solidFill>
+            </a:ln>
+          </p:spPr>
+          <p:style>
+            <a:lnRef idx="2">
+              <a:schemeClr val="accent1">
+                <a:shade val="50000"/>
+              </a:schemeClr>
+            </a:lnRef>
+            <a:fillRef idx="1">
+              <a:schemeClr val="accent1"/>
+            </a:fillRef>
+            <a:effectRef idx="0">
+              <a:schemeClr val="accent1"/>
+            </a:effectRef>
+            <a:fontRef idx="minor">
+              <a:schemeClr val="lt1"/>
+            </a:fontRef>
+          </p:style>
+          <p:txBody>
+            <a:bodyPr rtlCol="0" anchor="ctr"/>
+            <a:lstStyle/>
+            <a:p>
+              <a:pPr algn="ctr"/>
+              <a:endParaRPr lang="en-US"/>
+            </a:p>
+          </p:txBody>
+        </p:sp>
+        <p:sp>
+          <p:nvSpPr>
+            <p:cNvPr id="49" name="TextBox 48"/>
+            <p:cNvSpPr txBox="1"/>
+            <p:nvPr/>
+          </p:nvSpPr>
+          <p:spPr>
+            <a:xfrm>
+              <a:off x="8381994" y="4968292"/>
+              <a:ext cx="3155084" cy="369332"/>
+            </a:xfrm>
+            <a:prstGeom prst="rect">
+              <a:avLst/>
+            </a:prstGeom>
+            <a:solidFill>
+              <a:schemeClr val="bg1">
+                <a:lumMod val="85000"/>
+              </a:schemeClr>
+            </a:solidFill>
+          </p:spPr>
+          <p:txBody>
+            <a:bodyPr wrap="square" rtlCol="0">
+              <a:spAutoFit/>
+            </a:bodyPr>
+            <a:lstStyle/>
+            <a:p>
+              <a:pPr algn="ctr"/>
+              <a:r>
+                <a:rPr lang="en-US" b="1" dirty="0" smtClean="0"/>
+                <a:t>Product1 Value Proposition</a:t>
+              </a:r>
+              <a:endParaRPr lang="en-US" b="1" dirty="0"/>
+            </a:p>
+          </p:txBody>
+        </p:sp>
+        <p:pic>
+          <p:nvPicPr>
+            <p:cNvPr id="53" name="Picture 52"/>
+            <p:cNvPicPr>
+              <a:picLocks noChangeAspect="1"/>
+            </p:cNvPicPr>
+            <p:nvPr/>
+          </p:nvPicPr>
+          <p:blipFill>
+            <a:blip r:embed="rId13" cstate="print">
+              <a:extLst>
+                <a:ext uri="{28A0092B-C50C-407E-A947-70E740481C1C}">
+                  <a14:useLocalDpi xmlns:a14="http://schemas.microsoft.com/office/drawing/2010/main" val="0"/>
+                </a:ext>
+              </a:extLst>
+            </a:blip>
+            <a:stretch>
+              <a:fillRect/>
+            </a:stretch>
+          </p:blipFill>
+          <p:spPr>
+            <a:xfrm>
+              <a:off x="8874400" y="5442864"/>
+              <a:ext cx="2239920" cy="1190157"/>
+            </a:xfrm>
+            <a:prstGeom prst="rect">
+              <a:avLst/>
+            </a:prstGeom>
+          </p:spPr>
+        </p:pic>
+      </p:grpSp>
+      <p:grpSp>
+        <p:nvGrpSpPr>
+          <p:cNvPr id="60" name="Group 59"/>
+          <p:cNvGrpSpPr/>
+          <p:nvPr/>
+        </p:nvGrpSpPr>
+        <p:grpSpPr>
+          <a:xfrm>
+            <a:off x="8217629" y="1059362"/>
+            <a:ext cx="3323772" cy="1814286"/>
+            <a:chOff x="4420007" y="4891305"/>
+            <a:chExt cx="3323772" cy="1814286"/>
+          </a:xfrm>
+        </p:grpSpPr>
+        <p:sp>
+          <p:nvSpPr>
+            <p:cNvPr id="46" name="Rectangle 45"/>
+            <p:cNvSpPr/>
+            <p:nvPr/>
+          </p:nvSpPr>
+          <p:spPr>
+            <a:xfrm>
+              <a:off x="4420007" y="4891305"/>
+              <a:ext cx="3323772" cy="1814286"/>
+            </a:xfrm>
+            <a:prstGeom prst="rect">
+              <a:avLst/>
+            </a:prstGeom>
+            <a:solidFill>
+              <a:schemeClr val="bg1"/>
+            </a:solidFill>
+            <a:ln>
+              <a:solidFill>
+                <a:schemeClr val="bg1">
+                  <a:lumMod val="65000"/>
+                </a:schemeClr>
+              </a:solidFill>
+            </a:ln>
+          </p:spPr>
+          <p:style>
+            <a:lnRef idx="2">
+              <a:schemeClr val="accent1">
+                <a:shade val="50000"/>
+              </a:schemeClr>
+            </a:lnRef>
+            <a:fillRef idx="1">
+              <a:schemeClr val="accent1"/>
+            </a:fillRef>
+            <a:effectRef idx="0">
+              <a:schemeClr val="accent1"/>
+            </a:effectRef>
+            <a:fontRef idx="minor">
+              <a:schemeClr val="lt1"/>
+            </a:fontRef>
+          </p:style>
+          <p:txBody>
+            <a:bodyPr rtlCol="0" anchor="ctr"/>
+            <a:lstStyle/>
+            <a:p>
+              <a:pPr algn="ctr"/>
+              <a:endParaRPr lang="en-US"/>
+            </a:p>
+          </p:txBody>
+        </p:sp>
+        <p:sp>
+          <p:nvSpPr>
+            <p:cNvPr id="48" name="TextBox 47"/>
+            <p:cNvSpPr txBox="1"/>
+            <p:nvPr/>
+          </p:nvSpPr>
+          <p:spPr>
+            <a:xfrm>
+              <a:off x="4492169" y="4968292"/>
+              <a:ext cx="3170054" cy="369332"/>
+            </a:xfrm>
+            <a:prstGeom prst="rect">
+              <a:avLst/>
+            </a:prstGeom>
+            <a:solidFill>
+              <a:schemeClr val="bg1">
+                <a:lumMod val="85000"/>
+              </a:schemeClr>
+            </a:solidFill>
+          </p:spPr>
+          <p:txBody>
+            <a:bodyPr wrap="square" rtlCol="0">
+              <a:spAutoFit/>
+            </a:bodyPr>
+            <a:lstStyle/>
+            <a:p>
+              <a:pPr algn="ctr"/>
+              <a:r>
+                <a:rPr lang="en-US" b="1" dirty="0" smtClean="0"/>
+                <a:t>Tailored Pitch</a:t>
+              </a:r>
+              <a:endParaRPr lang="en-US" b="1" dirty="0"/>
+            </a:p>
+          </p:txBody>
+        </p:sp>
+        <p:sp>
+          <p:nvSpPr>
+            <p:cNvPr id="54" name="TextBox 53"/>
+            <p:cNvSpPr txBox="1"/>
+            <p:nvPr/>
+          </p:nvSpPr>
+          <p:spPr>
+            <a:xfrm>
+              <a:off x="4564538" y="5482998"/>
+              <a:ext cx="3133311" cy="1077218"/>
+            </a:xfrm>
+            <a:prstGeom prst="rect">
+              <a:avLst/>
+            </a:prstGeom>
+            <a:noFill/>
+          </p:spPr>
+          <p:txBody>
+            <a:bodyPr wrap="square" rtlCol="0">
+              <a:spAutoFit/>
+            </a:bodyPr>
+            <a:lstStyle/>
+            <a:p>
+              <a:pPr marL="285750" indent="-285750">
+                <a:buFont typeface="Arial" panose="020B0604020202020204" pitchFamily="34" charset="0"/>
+                <a:buChar char="•"/>
+              </a:pPr>
+              <a:r>
+                <a:rPr lang="en-US" sz="1600" dirty="0" smtClean="0"/>
+                <a:t>become lean, innovative, and competitive</a:t>
+              </a:r>
+            </a:p>
+            <a:p>
+              <a:pPr marL="285750" indent="-285750">
+                <a:buFont typeface="Arial" panose="020B0604020202020204" pitchFamily="34" charset="0"/>
+                <a:buChar char="•"/>
+              </a:pPr>
+              <a:r>
+                <a:rPr lang="en-US" sz="1600" dirty="0" smtClean="0"/>
+                <a:t>improve conversion</a:t>
+              </a:r>
+            </a:p>
+            <a:p>
+              <a:pPr marL="285750" indent="-285750">
+                <a:buFont typeface="Arial" panose="020B0604020202020204" pitchFamily="34" charset="0"/>
+                <a:buChar char="•"/>
+              </a:pPr>
+              <a:r>
+                <a:rPr lang="en-US" sz="1600" dirty="0" smtClean="0"/>
+                <a:t>simple dashboard</a:t>
+              </a:r>
+              <a:endParaRPr lang="en-US" sz="1600" dirty="0"/>
+            </a:p>
+          </p:txBody>
+        </p:sp>
+      </p:grpSp>
+      <p:sp>
+        <p:nvSpPr>
+          <p:cNvPr id="43" name="Rectangle 42"/>
+          <p:cNvSpPr/>
+          <p:nvPr/>
+        </p:nvSpPr>
+        <p:spPr>
+          <a:xfrm>
+            <a:off x="4434114" y="4898562"/>
+            <a:ext cx="3323772" cy="1814286"/>
+          </a:xfrm>
+          <a:prstGeom prst="rect">
+            <a:avLst/>
+          </a:prstGeom>
+          <a:solidFill>
+            <a:schemeClr val="bg1"/>
+          </a:solidFill>
+          <a:ln>
+            <a:solidFill>
+              <a:schemeClr val="bg1">
+                <a:lumMod val="65000"/>
+              </a:schemeClr>
+            </a:solidFill>
+          </a:ln>
+        </p:spPr>
+        <p:style>
+          <a:lnRef idx="2">
+            <a:schemeClr val="accent1">
+              <a:shade val="50000"/>
+            </a:schemeClr>
+          </a:lnRef>
+          <a:fillRef idx="1">
+            <a:schemeClr val="accent1"/>
+          </a:fillRef>
+          <a:effectRef idx="0">
+            <a:schemeClr val="accent1"/>
+          </a:effectRef>
+          <a:fontRef idx="minor">
+            <a:schemeClr val="lt1"/>
+          </a:fontRef>
+        </p:style>
+        <p:txBody>
+          <a:bodyPr rtlCol="0" anchor="ctr"/>
+          <a:lstStyle/>
+          <a:p>
+            <a:pPr algn="ctr"/>
+            <a:endParaRPr lang="en-US"/>
+          </a:p>
+        </p:txBody>
+      </p:sp>
+      <p:sp>
+        <p:nvSpPr>
+          <p:cNvPr id="2" name="Oval 1"/>
+          <p:cNvSpPr/>
+          <p:nvPr/>
+        </p:nvSpPr>
+        <p:spPr>
+          <a:xfrm>
+            <a:off x="4720770" y="5172501"/>
+            <a:ext cx="2611104" cy="1214651"/>
+          </a:xfrm>
+          <a:prstGeom prst="ellipse">
+            <a:avLst/>
+          </a:prstGeom>
+          <a:noFill/>
+          <a:ln>
+            <a:noFill/>
+          </a:ln>
+        </p:spPr>
+        <p:style>
+          <a:lnRef idx="2">
+            <a:schemeClr val="accent1">
+              <a:shade val="50000"/>
+            </a:schemeClr>
+          </a:lnRef>
+          <a:fillRef idx="1">
+            <a:schemeClr val="accent1"/>
+          </a:fillRef>
+          <a:effectRef idx="0">
+            <a:schemeClr val="accent1"/>
+          </a:effectRef>
+          <a:fontRef idx="minor">
+            <a:schemeClr val="lt1"/>
+          </a:fontRef>
+        </p:style>
+        <p:txBody>
+          <a:bodyPr rtlCol="0" anchor="ctr"/>
+          <a:lstStyle/>
+          <a:p>
+            <a:pPr algn="ctr"/>
+            <a:r>
+              <a:rPr lang="en-US" dirty="0" smtClean="0">
+                <a:solidFill>
+                  <a:schemeClr val="bg1">
+                    <a:lumMod val="50000"/>
+                  </a:schemeClr>
+                </a:solidFill>
+              </a:rPr>
+              <a:t>Your customized card here …</a:t>
+            </a:r>
+            <a:endParaRPr lang="en-US" dirty="0">
+              <a:solidFill>
+                <a:schemeClr val="bg1">
+                  <a:lumMod val="50000"/>
+                </a:schemeClr>
+              </a:solidFill>
+            </a:endParaRPr>
+          </a:p>
+        </p:txBody>
+      </p:sp>
+    </p:spTree>
+    <p:extLst>
+      <p:ext uri="{BB962C8B-B14F-4D97-AF65-F5344CB8AC3E}">
+        <p14:creationId xmlns:p14="http://schemas.microsoft.com/office/powerpoint/2010/main" val="873933195"/>
+      </p:ext>
+    </p:extLst>
+  </p:cSld>
+  <p:clrMapOvr>
+    <a:masterClrMapping/>
+  </p:clrMapOvr>
+  <p:timing>
+    <p:tnLst>
+      <p:par>
+        <p:cTn id="1" dur="indefinite" restart="never" nodeType="tmRoot"/>
+      </p:par>
+    </p:tnLst>
+  </p:timing>
+</p:sld>
+</file>
+
 <file path=ppt/theme/theme1.xml><?xml version="1.0" encoding="utf-8"?>
 <a:theme xmlns:a="http://schemas.openxmlformats.org/drawingml/2006/main" name="Office Theme">
   <a:themeElements>

</xml_diff>